<commit_message>
updated the ppt to have DELETION process
</commit_message>
<xml_diff>
--- a/cp3407-project-v2025a-main/cp3407-project-v2024-main/Glamup_InnerWorkings.pptx
+++ b/cp3407-project-v2025a-main/cp3407-project-v2024-main/Glamup_InnerWorkings.pptx
@@ -30,7 +30,11 @@
     <p:sldId id="279" r:id="rId24"/>
     <p:sldId id="280" r:id="rId25"/>
     <p:sldId id="281" r:id="rId26"/>
-    <p:sldId id="282" r:id="rId27"/>
+    <p:sldId id="283" r:id="rId27"/>
+    <p:sldId id="284" r:id="rId28"/>
+    <p:sldId id="285" r:id="rId29"/>
+    <p:sldId id="286" r:id="rId30"/>
+    <p:sldId id="282" r:id="rId31"/>
   </p:sldIdLst>
   <p:sldSz cx="12192000" cy="6858000"/>
   <p:notesSz cx="6858000" cy="9144000"/>
@@ -129,6 +133,11 @@
       </a:defRPr>
     </a:lvl9pPr>
   </p:defaultTextStyle>
+  <p:extLst>
+    <p:ext uri="{EFAFB233-063F-42B5-8137-9DF3F51BA10A}">
+      <p15:sldGuideLst xmlns:p15="http://schemas.microsoft.com/office/powerpoint/2012/main"/>
+    </p:ext>
+  </p:extLst>
 </p:presentation>
 </file>
 
@@ -281,7 +290,7 @@
           <a:p>
             <a:fld id="{734758C6-229C-48BB-8D78-B42BA924921E}" type="datetimeFigureOut">
               <a:rPr lang="en-SG" smtClean="0"/>
-              <a:t>21/4/2025</a:t>
+              <a:t>26/4/2025</a:t>
             </a:fld>
             <a:endParaRPr lang="en-SG"/>
           </a:p>
@@ -481,7 +490,7 @@
           <a:p>
             <a:fld id="{734758C6-229C-48BB-8D78-B42BA924921E}" type="datetimeFigureOut">
               <a:rPr lang="en-SG" smtClean="0"/>
-              <a:t>21/4/2025</a:t>
+              <a:t>26/4/2025</a:t>
             </a:fld>
             <a:endParaRPr lang="en-SG"/>
           </a:p>
@@ -691,7 +700,7 @@
           <a:p>
             <a:fld id="{734758C6-229C-48BB-8D78-B42BA924921E}" type="datetimeFigureOut">
               <a:rPr lang="en-SG" smtClean="0"/>
-              <a:t>21/4/2025</a:t>
+              <a:t>26/4/2025</a:t>
             </a:fld>
             <a:endParaRPr lang="en-SG"/>
           </a:p>
@@ -891,7 +900,7 @@
           <a:p>
             <a:fld id="{734758C6-229C-48BB-8D78-B42BA924921E}" type="datetimeFigureOut">
               <a:rPr lang="en-SG" smtClean="0"/>
-              <a:t>21/4/2025</a:t>
+              <a:t>26/4/2025</a:t>
             </a:fld>
             <a:endParaRPr lang="en-SG"/>
           </a:p>
@@ -1167,7 +1176,7 @@
           <a:p>
             <a:fld id="{734758C6-229C-48BB-8D78-B42BA924921E}" type="datetimeFigureOut">
               <a:rPr lang="en-SG" smtClean="0"/>
-              <a:t>21/4/2025</a:t>
+              <a:t>26/4/2025</a:t>
             </a:fld>
             <a:endParaRPr lang="en-SG"/>
           </a:p>
@@ -1435,7 +1444,7 @@
           <a:p>
             <a:fld id="{734758C6-229C-48BB-8D78-B42BA924921E}" type="datetimeFigureOut">
               <a:rPr lang="en-SG" smtClean="0"/>
-              <a:t>21/4/2025</a:t>
+              <a:t>26/4/2025</a:t>
             </a:fld>
             <a:endParaRPr lang="en-SG"/>
           </a:p>
@@ -1850,7 +1859,7 @@
           <a:p>
             <a:fld id="{734758C6-229C-48BB-8D78-B42BA924921E}" type="datetimeFigureOut">
               <a:rPr lang="en-SG" smtClean="0"/>
-              <a:t>21/4/2025</a:t>
+              <a:t>26/4/2025</a:t>
             </a:fld>
             <a:endParaRPr lang="en-SG"/>
           </a:p>
@@ -1992,7 +2001,7 @@
           <a:p>
             <a:fld id="{734758C6-229C-48BB-8D78-B42BA924921E}" type="datetimeFigureOut">
               <a:rPr lang="en-SG" smtClean="0"/>
-              <a:t>21/4/2025</a:t>
+              <a:t>26/4/2025</a:t>
             </a:fld>
             <a:endParaRPr lang="en-SG"/>
           </a:p>
@@ -2105,7 +2114,7 @@
           <a:p>
             <a:fld id="{734758C6-229C-48BB-8D78-B42BA924921E}" type="datetimeFigureOut">
               <a:rPr lang="en-SG" smtClean="0"/>
-              <a:t>21/4/2025</a:t>
+              <a:t>26/4/2025</a:t>
             </a:fld>
             <a:endParaRPr lang="en-SG"/>
           </a:p>
@@ -2418,7 +2427,7 @@
           <a:p>
             <a:fld id="{734758C6-229C-48BB-8D78-B42BA924921E}" type="datetimeFigureOut">
               <a:rPr lang="en-SG" smtClean="0"/>
-              <a:t>21/4/2025</a:t>
+              <a:t>26/4/2025</a:t>
             </a:fld>
             <a:endParaRPr lang="en-SG"/>
           </a:p>
@@ -2707,7 +2716,7 @@
           <a:p>
             <a:fld id="{734758C6-229C-48BB-8D78-B42BA924921E}" type="datetimeFigureOut">
               <a:rPr lang="en-SG" smtClean="0"/>
-              <a:t>21/4/2025</a:t>
+              <a:t>26/4/2025</a:t>
             </a:fld>
             <a:endParaRPr lang="en-SG"/>
           </a:p>
@@ -2950,7 +2959,7 @@
           <a:p>
             <a:fld id="{734758C6-229C-48BB-8D78-B42BA924921E}" type="datetimeFigureOut">
               <a:rPr lang="en-SG" smtClean="0"/>
-              <a:t>21/4/2025</a:t>
+              <a:t>26/4/2025</a:t>
             </a:fld>
             <a:endParaRPr lang="en-SG"/>
           </a:p>
@@ -6596,7 +6605,13 @@
   <p:cSld>
     <p:spTree>
       <p:nvGrpSpPr>
-        <p:cNvPr id="1" name=""/>
+        <p:cNvPr id="1" name="">
+          <a:extLst>
+            <a:ext uri="{FF2B5EF4-FFF2-40B4-BE49-F238E27FC236}">
+              <a16:creationId xmlns:a16="http://schemas.microsoft.com/office/drawing/2014/main" id="{20B905DF-D49B-9290-2DAE-E813E7C0A36D}"/>
+            </a:ext>
+          </a:extLst>
+        </p:cNvPr>
         <p:cNvGrpSpPr/>
         <p:nvPr/>
       </p:nvGrpSpPr>
@@ -6608,38 +6623,73 @@
           <a:chExt cx="0" cy="0"/>
         </a:xfrm>
       </p:grpSpPr>
-      <p:sp>
-        <p:nvSpPr>
-          <p:cNvPr id="2" name="Title 1">
-            <a:extLst>
-              <a:ext uri="{FF2B5EF4-FFF2-40B4-BE49-F238E27FC236}">
-                <a16:creationId xmlns:a16="http://schemas.microsoft.com/office/drawing/2014/main" id="{5862D4D3-736D-5CC7-6715-5B7872E316FA}"/>
-              </a:ext>
-            </a:extLst>
-          </p:cNvPr>
-          <p:cNvSpPr>
-            <a:spLocks noGrp="1"/>
-          </p:cNvSpPr>
-          <p:nvPr>
-            <p:ph type="ctrTitle"/>
-          </p:nvPr>
-        </p:nvSpPr>
-        <p:spPr/>
-        <p:txBody>
-          <a:bodyPr/>
+      <p:pic>
+        <p:nvPicPr>
+          <p:cNvPr id="3" name="Picture 2">
+            <a:extLst>
+              <a:ext uri="{FF2B5EF4-FFF2-40B4-BE49-F238E27FC236}">
+                <a16:creationId xmlns:a16="http://schemas.microsoft.com/office/drawing/2014/main" id="{FDF0AE9A-F619-0184-82BC-212D22A7CE32}"/>
+              </a:ext>
+            </a:extLst>
+          </p:cNvPr>
+          <p:cNvPicPr>
+            <a:picLocks noChangeAspect="1"/>
+          </p:cNvPicPr>
+          <p:nvPr/>
+        </p:nvPicPr>
+        <p:blipFill>
+          <a:blip r:embed="rId2">
+            <a:extLst>
+              <a:ext uri="{28A0092B-C50C-407E-A947-70E740481C1C}">
+                <a14:useLocalDpi xmlns:a14="http://schemas.microsoft.com/office/drawing/2010/main" val="0"/>
+              </a:ext>
+            </a:extLst>
+          </a:blip>
+          <a:stretch>
+            <a:fillRect/>
+          </a:stretch>
+        </p:blipFill>
+        <p:spPr>
+          <a:xfrm>
+            <a:off x="0" y="539915"/>
+            <a:ext cx="12192000" cy="5778169"/>
+          </a:xfrm>
+          <a:prstGeom prst="rect">
+            <a:avLst/>
+          </a:prstGeom>
+        </p:spPr>
+      </p:pic>
+      <p:sp>
+        <p:nvSpPr>
+          <p:cNvPr id="4" name="TextBox 3">
+            <a:extLst>
+              <a:ext uri="{FF2B5EF4-FFF2-40B4-BE49-F238E27FC236}">
+                <a16:creationId xmlns:a16="http://schemas.microsoft.com/office/drawing/2014/main" id="{189A4DB0-E69A-A84A-EF42-8C15FDE909FE}"/>
+              </a:ext>
+            </a:extLst>
+          </p:cNvPr>
+          <p:cNvSpPr txBox="1"/>
+          <p:nvPr/>
+        </p:nvSpPr>
+        <p:spPr>
+          <a:xfrm>
+            <a:off x="9117400" y="3785489"/>
+            <a:ext cx="2632512" cy="923330"/>
+          </a:xfrm>
+          <a:prstGeom prst="rect">
+            <a:avLst/>
+          </a:prstGeom>
+          <a:noFill/>
+        </p:spPr>
+        <p:txBody>
+          <a:bodyPr wrap="square" rtlCol="0">
+            <a:spAutoFit/>
+          </a:bodyPr>
           <a:lstStyle/>
           <a:p>
             <a:r>
               <a:rPr lang="en-US" dirty="0"/>
-              <a:t>That’s how </a:t>
-            </a:r>
-            <a:r>
-              <a:rPr lang="en-US" dirty="0" err="1"/>
-              <a:t>Glamup</a:t>
-            </a:r>
-            <a:r>
-              <a:rPr lang="en-US" dirty="0"/>
-              <a:t> Works!</a:t>
+              <a:t>I have added a new feature: delete bookings from the database</a:t>
             </a:r>
             <a:endParaRPr lang="en-SG" dirty="0"/>
           </a:p>
@@ -6647,37 +6697,502 @@
       </p:sp>
       <p:sp>
         <p:nvSpPr>
-          <p:cNvPr id="3" name="Subtitle 2">
-            <a:extLst>
-              <a:ext uri="{FF2B5EF4-FFF2-40B4-BE49-F238E27FC236}">
-                <a16:creationId xmlns:a16="http://schemas.microsoft.com/office/drawing/2014/main" id="{CA245029-3AD8-3686-1F4B-DEEC3902D5FC}"/>
-              </a:ext>
-            </a:extLst>
-          </p:cNvPr>
-          <p:cNvSpPr>
-            <a:spLocks noGrp="1"/>
-          </p:cNvSpPr>
-          <p:nvPr>
-            <p:ph type="subTitle" idx="1"/>
-          </p:nvPr>
-        </p:nvSpPr>
-        <p:spPr/>
-        <p:txBody>
-          <a:bodyPr/>
-          <a:lstStyle/>
-          <a:p>
-            <a:r>
-              <a:rPr lang="en-US" dirty="0"/>
-              <a:t>Thank you for watching!</a:t>
-            </a:r>
-            <a:endParaRPr lang="en-SG" dirty="0"/>
+          <p:cNvPr id="7" name="Oval 6">
+            <a:extLst>
+              <a:ext uri="{FF2B5EF4-FFF2-40B4-BE49-F238E27FC236}">
+                <a16:creationId xmlns:a16="http://schemas.microsoft.com/office/drawing/2014/main" id="{B2F1E2CD-30A6-A53B-9A0E-B635E66BF4DA}"/>
+              </a:ext>
+            </a:extLst>
+          </p:cNvPr>
+          <p:cNvSpPr/>
+          <p:nvPr/>
+        </p:nvSpPr>
+        <p:spPr>
+          <a:xfrm>
+            <a:off x="11420119" y="3204444"/>
+            <a:ext cx="659586" cy="449109"/>
+          </a:xfrm>
+          <a:prstGeom prst="ellipse">
+            <a:avLst/>
+          </a:prstGeom>
+          <a:noFill/>
+          <a:ln w="28575">
+            <a:solidFill>
+              <a:srgbClr val="FFFF00"/>
+            </a:solidFill>
+          </a:ln>
+        </p:spPr>
+        <p:style>
+          <a:lnRef idx="2">
+            <a:schemeClr val="accent1">
+              <a:shade val="15000"/>
+            </a:schemeClr>
+          </a:lnRef>
+          <a:fillRef idx="1">
+            <a:schemeClr val="accent1"/>
+          </a:fillRef>
+          <a:effectRef idx="0">
+            <a:schemeClr val="accent1"/>
+          </a:effectRef>
+          <a:fontRef idx="minor">
+            <a:schemeClr val="lt1"/>
+          </a:fontRef>
+        </p:style>
+        <p:txBody>
+          <a:bodyPr rtlCol="0" anchor="ctr"/>
+          <a:lstStyle/>
+          <a:p>
+            <a:pPr algn="ctr"/>
+            <a:endParaRPr lang="en-SG"/>
           </a:p>
         </p:txBody>
       </p:sp>
     </p:spTree>
     <p:extLst>
       <p:ext uri="{BB962C8B-B14F-4D97-AF65-F5344CB8AC3E}">
-        <p14:creationId xmlns:p14="http://schemas.microsoft.com/office/powerpoint/2010/main" val="3760336653"/>
+        <p14:creationId xmlns:p14="http://schemas.microsoft.com/office/powerpoint/2010/main" val="356172986"/>
+      </p:ext>
+    </p:extLst>
+  </p:cSld>
+  <p:clrMapOvr>
+    <a:masterClrMapping/>
+  </p:clrMapOvr>
+</p:sld>
+</file>
+
+<file path=ppt/slides/slide27.xml><?xml version="1.0" encoding="utf-8"?>
+<p:sld xmlns:a="http://schemas.openxmlformats.org/drawingml/2006/main" xmlns:r="http://schemas.openxmlformats.org/officeDocument/2006/relationships" xmlns:p="http://schemas.openxmlformats.org/presentationml/2006/main">
+  <p:cSld>
+    <p:spTree>
+      <p:nvGrpSpPr>
+        <p:cNvPr id="1" name="">
+          <a:extLst>
+            <a:ext uri="{FF2B5EF4-FFF2-40B4-BE49-F238E27FC236}">
+              <a16:creationId xmlns:a16="http://schemas.microsoft.com/office/drawing/2014/main" id="{1194101F-6466-F006-561B-BD0A3A56BEA9}"/>
+            </a:ext>
+          </a:extLst>
+        </p:cNvPr>
+        <p:cNvGrpSpPr/>
+        <p:nvPr/>
+      </p:nvGrpSpPr>
+      <p:grpSpPr>
+        <a:xfrm>
+          <a:off x="0" y="0"/>
+          <a:ext cx="0" cy="0"/>
+          <a:chOff x="0" y="0"/>
+          <a:chExt cx="0" cy="0"/>
+        </a:xfrm>
+      </p:grpSpPr>
+      <p:pic>
+        <p:nvPicPr>
+          <p:cNvPr id="5" name="Picture 4">
+            <a:extLst>
+              <a:ext uri="{FF2B5EF4-FFF2-40B4-BE49-F238E27FC236}">
+                <a16:creationId xmlns:a16="http://schemas.microsoft.com/office/drawing/2014/main" id="{4FE72FA3-C487-9527-AAC5-2C3C043B0448}"/>
+              </a:ext>
+            </a:extLst>
+          </p:cNvPr>
+          <p:cNvPicPr>
+            <a:picLocks noChangeAspect="1"/>
+          </p:cNvPicPr>
+          <p:nvPr/>
+        </p:nvPicPr>
+        <p:blipFill>
+          <a:blip r:embed="rId2">
+            <a:extLst>
+              <a:ext uri="{28A0092B-C50C-407E-A947-70E740481C1C}">
+                <a14:useLocalDpi xmlns:a14="http://schemas.microsoft.com/office/drawing/2010/main" val="0"/>
+              </a:ext>
+            </a:extLst>
+          </a:blip>
+          <a:stretch>
+            <a:fillRect/>
+          </a:stretch>
+        </p:blipFill>
+        <p:spPr>
+          <a:xfrm>
+            <a:off x="0" y="533559"/>
+            <a:ext cx="12192000" cy="5790882"/>
+          </a:xfrm>
+          <a:prstGeom prst="rect">
+            <a:avLst/>
+          </a:prstGeom>
+        </p:spPr>
+      </p:pic>
+      <p:sp>
+        <p:nvSpPr>
+          <p:cNvPr id="6" name="TextBox 5">
+            <a:extLst>
+              <a:ext uri="{FF2B5EF4-FFF2-40B4-BE49-F238E27FC236}">
+                <a16:creationId xmlns:a16="http://schemas.microsoft.com/office/drawing/2014/main" id="{343C8005-2F5B-4D6F-DE2F-08647A8FA214}"/>
+              </a:ext>
+            </a:extLst>
+          </p:cNvPr>
+          <p:cNvSpPr txBox="1"/>
+          <p:nvPr/>
+        </p:nvSpPr>
+        <p:spPr>
+          <a:xfrm>
+            <a:off x="5643288" y="4168575"/>
+            <a:ext cx="3235535" cy="369332"/>
+          </a:xfrm>
+          <a:prstGeom prst="rect">
+            <a:avLst/>
+          </a:prstGeom>
+          <a:noFill/>
+        </p:spPr>
+        <p:txBody>
+          <a:bodyPr wrap="square" rtlCol="0">
+            <a:spAutoFit/>
+          </a:bodyPr>
+          <a:lstStyle/>
+          <a:p>
+            <a:r>
+              <a:rPr lang="en-US" dirty="0"/>
+              <a:t>(now only one booking left)</a:t>
+            </a:r>
+            <a:endParaRPr lang="en-SG" dirty="0"/>
+          </a:p>
+        </p:txBody>
+      </p:sp>
+    </p:spTree>
+    <p:extLst>
+      <p:ext uri="{BB962C8B-B14F-4D97-AF65-F5344CB8AC3E}">
+        <p14:creationId xmlns:p14="http://schemas.microsoft.com/office/powerpoint/2010/main" val="1997895401"/>
+      </p:ext>
+    </p:extLst>
+  </p:cSld>
+  <p:clrMapOvr>
+    <a:masterClrMapping/>
+  </p:clrMapOvr>
+</p:sld>
+</file>
+
+<file path=ppt/slides/slide28.xml><?xml version="1.0" encoding="utf-8"?>
+<p:sld xmlns:a="http://schemas.openxmlformats.org/drawingml/2006/main" xmlns:r="http://schemas.openxmlformats.org/officeDocument/2006/relationships" xmlns:p="http://schemas.openxmlformats.org/presentationml/2006/main">
+  <p:cSld>
+    <p:spTree>
+      <p:nvGrpSpPr>
+        <p:cNvPr id="1" name="">
+          <a:extLst>
+            <a:ext uri="{FF2B5EF4-FFF2-40B4-BE49-F238E27FC236}">
+              <a16:creationId xmlns:a16="http://schemas.microsoft.com/office/drawing/2014/main" id="{72EA4293-C3F1-1D5F-E414-E5F75932281F}"/>
+            </a:ext>
+          </a:extLst>
+        </p:cNvPr>
+        <p:cNvGrpSpPr/>
+        <p:nvPr/>
+      </p:nvGrpSpPr>
+      <p:grpSpPr>
+        <a:xfrm>
+          <a:off x="0" y="0"/>
+          <a:ext cx="0" cy="0"/>
+          <a:chOff x="0" y="0"/>
+          <a:chExt cx="0" cy="0"/>
+        </a:xfrm>
+      </p:grpSpPr>
+      <p:pic>
+        <p:nvPicPr>
+          <p:cNvPr id="4" name="Picture 3">
+            <a:extLst>
+              <a:ext uri="{FF2B5EF4-FFF2-40B4-BE49-F238E27FC236}">
+                <a16:creationId xmlns:a16="http://schemas.microsoft.com/office/drawing/2014/main" id="{60382C46-74D5-7FFE-B29A-69DEB16AFD35}"/>
+              </a:ext>
+            </a:extLst>
+          </p:cNvPr>
+          <p:cNvPicPr>
+            <a:picLocks noChangeAspect="1"/>
+          </p:cNvPicPr>
+          <p:nvPr/>
+        </p:nvPicPr>
+        <p:blipFill>
+          <a:blip r:embed="rId2">
+            <a:extLst>
+              <a:ext uri="{28A0092B-C50C-407E-A947-70E740481C1C}">
+                <a14:useLocalDpi xmlns:a14="http://schemas.microsoft.com/office/drawing/2010/main" val="0"/>
+              </a:ext>
+            </a:extLst>
+          </a:blip>
+          <a:stretch>
+            <a:fillRect/>
+          </a:stretch>
+        </p:blipFill>
+        <p:spPr>
+          <a:xfrm>
+            <a:off x="0" y="540081"/>
+            <a:ext cx="12192000" cy="5777837"/>
+          </a:xfrm>
+          <a:prstGeom prst="rect">
+            <a:avLst/>
+          </a:prstGeom>
+        </p:spPr>
+      </p:pic>
+      <p:sp>
+        <p:nvSpPr>
+          <p:cNvPr id="7" name="TextBox 6">
+            <a:extLst>
+              <a:ext uri="{FF2B5EF4-FFF2-40B4-BE49-F238E27FC236}">
+                <a16:creationId xmlns:a16="http://schemas.microsoft.com/office/drawing/2014/main" id="{B44B4D2F-E96C-694D-58E5-8A8A0E9CC121}"/>
+              </a:ext>
+            </a:extLst>
+          </p:cNvPr>
+          <p:cNvSpPr txBox="1"/>
+          <p:nvPr/>
+        </p:nvSpPr>
+        <p:spPr>
+          <a:xfrm>
+            <a:off x="185764" y="3860567"/>
+            <a:ext cx="3235535" cy="646331"/>
+          </a:xfrm>
+          <a:prstGeom prst="rect">
+            <a:avLst/>
+          </a:prstGeom>
+          <a:noFill/>
+        </p:spPr>
+        <p:txBody>
+          <a:bodyPr wrap="square" rtlCol="0">
+            <a:spAutoFit/>
+          </a:bodyPr>
+          <a:lstStyle/>
+          <a:p>
+            <a:r>
+              <a:rPr lang="en-US" dirty="0"/>
+              <a:t>(Database view: </a:t>
+            </a:r>
+            <a:br>
+              <a:rPr lang="en-US" dirty="0"/>
+            </a:br>
+            <a:r>
+              <a:rPr lang="en-US" dirty="0"/>
+              <a:t>BEFORE deletion)</a:t>
+            </a:r>
+            <a:endParaRPr lang="en-SG" dirty="0"/>
+          </a:p>
+        </p:txBody>
+      </p:sp>
+      <p:sp>
+        <p:nvSpPr>
+          <p:cNvPr id="8" name="Oval 7">
+            <a:extLst>
+              <a:ext uri="{FF2B5EF4-FFF2-40B4-BE49-F238E27FC236}">
+                <a16:creationId xmlns:a16="http://schemas.microsoft.com/office/drawing/2014/main" id="{0B8ADF57-FA8D-E016-7C43-4107C83F6C7F}"/>
+              </a:ext>
+            </a:extLst>
+          </p:cNvPr>
+          <p:cNvSpPr/>
+          <p:nvPr/>
+        </p:nvSpPr>
+        <p:spPr>
+          <a:xfrm>
+            <a:off x="1209892" y="1982360"/>
+            <a:ext cx="838364" cy="651112"/>
+          </a:xfrm>
+          <a:prstGeom prst="ellipse">
+            <a:avLst/>
+          </a:prstGeom>
+          <a:noFill/>
+          <a:ln w="28575">
+            <a:solidFill>
+              <a:srgbClr val="FFFF00"/>
+            </a:solidFill>
+          </a:ln>
+        </p:spPr>
+        <p:style>
+          <a:lnRef idx="2">
+            <a:schemeClr val="accent1">
+              <a:shade val="15000"/>
+            </a:schemeClr>
+          </a:lnRef>
+          <a:fillRef idx="1">
+            <a:schemeClr val="accent1"/>
+          </a:fillRef>
+          <a:effectRef idx="0">
+            <a:schemeClr val="accent1"/>
+          </a:effectRef>
+          <a:fontRef idx="minor">
+            <a:schemeClr val="lt1"/>
+          </a:fontRef>
+        </p:style>
+        <p:txBody>
+          <a:bodyPr rtlCol="0" anchor="ctr"/>
+          <a:lstStyle/>
+          <a:p>
+            <a:pPr algn="ctr"/>
+            <a:endParaRPr lang="en-SG"/>
+          </a:p>
+        </p:txBody>
+      </p:sp>
+    </p:spTree>
+    <p:extLst>
+      <p:ext uri="{BB962C8B-B14F-4D97-AF65-F5344CB8AC3E}">
+        <p14:creationId xmlns:p14="http://schemas.microsoft.com/office/powerpoint/2010/main" val="2852136178"/>
+      </p:ext>
+    </p:extLst>
+  </p:cSld>
+  <p:clrMapOvr>
+    <a:masterClrMapping/>
+  </p:clrMapOvr>
+</p:sld>
+</file>
+
+<file path=ppt/slides/slide29.xml><?xml version="1.0" encoding="utf-8"?>
+<p:sld xmlns:a="http://schemas.openxmlformats.org/drawingml/2006/main" xmlns:r="http://schemas.openxmlformats.org/officeDocument/2006/relationships" xmlns:p="http://schemas.openxmlformats.org/presentationml/2006/main">
+  <p:cSld>
+    <p:spTree>
+      <p:nvGrpSpPr>
+        <p:cNvPr id="1" name="">
+          <a:extLst>
+            <a:ext uri="{FF2B5EF4-FFF2-40B4-BE49-F238E27FC236}">
+              <a16:creationId xmlns:a16="http://schemas.microsoft.com/office/drawing/2014/main" id="{38ECA1DE-25AA-1183-7C72-D77222BD7687}"/>
+            </a:ext>
+          </a:extLst>
+        </p:cNvPr>
+        <p:cNvGrpSpPr/>
+        <p:nvPr/>
+      </p:nvGrpSpPr>
+      <p:grpSpPr>
+        <a:xfrm>
+          <a:off x="0" y="0"/>
+          <a:ext cx="0" cy="0"/>
+          <a:chOff x="0" y="0"/>
+          <a:chExt cx="0" cy="0"/>
+        </a:xfrm>
+      </p:grpSpPr>
+      <p:pic>
+        <p:nvPicPr>
+          <p:cNvPr id="3" name="Picture 2">
+            <a:extLst>
+              <a:ext uri="{FF2B5EF4-FFF2-40B4-BE49-F238E27FC236}">
+                <a16:creationId xmlns:a16="http://schemas.microsoft.com/office/drawing/2014/main" id="{0925D1EB-9275-53A6-465E-D85AA893E897}"/>
+              </a:ext>
+            </a:extLst>
+          </p:cNvPr>
+          <p:cNvPicPr>
+            <a:picLocks noChangeAspect="1"/>
+          </p:cNvPicPr>
+          <p:nvPr/>
+        </p:nvPicPr>
+        <p:blipFill>
+          <a:blip r:embed="rId2">
+            <a:extLst>
+              <a:ext uri="{28A0092B-C50C-407E-A947-70E740481C1C}">
+                <a14:useLocalDpi xmlns:a14="http://schemas.microsoft.com/office/drawing/2010/main" val="0"/>
+              </a:ext>
+            </a:extLst>
+          </a:blip>
+          <a:stretch>
+            <a:fillRect/>
+          </a:stretch>
+        </p:blipFill>
+        <p:spPr>
+          <a:xfrm>
+            <a:off x="0" y="535551"/>
+            <a:ext cx="12192000" cy="5786898"/>
+          </a:xfrm>
+          <a:prstGeom prst="rect">
+            <a:avLst/>
+          </a:prstGeom>
+        </p:spPr>
+      </p:pic>
+      <p:sp>
+        <p:nvSpPr>
+          <p:cNvPr id="5" name="TextBox 4">
+            <a:extLst>
+              <a:ext uri="{FF2B5EF4-FFF2-40B4-BE49-F238E27FC236}">
+                <a16:creationId xmlns:a16="http://schemas.microsoft.com/office/drawing/2014/main" id="{8C642C6E-3F4A-A201-F893-56E038576D6F}"/>
+              </a:ext>
+            </a:extLst>
+          </p:cNvPr>
+          <p:cNvSpPr txBox="1"/>
+          <p:nvPr/>
+        </p:nvSpPr>
+        <p:spPr>
+          <a:xfrm>
+            <a:off x="185764" y="3860567"/>
+            <a:ext cx="3235535" cy="646331"/>
+          </a:xfrm>
+          <a:prstGeom prst="rect">
+            <a:avLst/>
+          </a:prstGeom>
+          <a:noFill/>
+        </p:spPr>
+        <p:txBody>
+          <a:bodyPr wrap="square" rtlCol="0">
+            <a:spAutoFit/>
+          </a:bodyPr>
+          <a:lstStyle/>
+          <a:p>
+            <a:r>
+              <a:rPr lang="en-US" dirty="0"/>
+              <a:t>(Database view: </a:t>
+            </a:r>
+            <a:br>
+              <a:rPr lang="en-US" dirty="0"/>
+            </a:br>
+            <a:r>
+              <a:rPr lang="en-US" dirty="0"/>
+              <a:t>AFTER deletion)</a:t>
+            </a:r>
+            <a:endParaRPr lang="en-SG" dirty="0"/>
+          </a:p>
+        </p:txBody>
+      </p:sp>
+      <p:sp>
+        <p:nvSpPr>
+          <p:cNvPr id="6" name="Oval 5">
+            <a:extLst>
+              <a:ext uri="{FF2B5EF4-FFF2-40B4-BE49-F238E27FC236}">
+                <a16:creationId xmlns:a16="http://schemas.microsoft.com/office/drawing/2014/main" id="{D9C13EC9-25EF-C7C7-0605-0CD3CD20B6B5}"/>
+              </a:ext>
+            </a:extLst>
+          </p:cNvPr>
+          <p:cNvSpPr/>
+          <p:nvPr/>
+        </p:nvSpPr>
+        <p:spPr>
+          <a:xfrm>
+            <a:off x="1209892" y="1982360"/>
+            <a:ext cx="765212" cy="477376"/>
+          </a:xfrm>
+          <a:prstGeom prst="ellipse">
+            <a:avLst/>
+          </a:prstGeom>
+          <a:noFill/>
+          <a:ln w="28575">
+            <a:solidFill>
+              <a:srgbClr val="FFFF00"/>
+            </a:solidFill>
+          </a:ln>
+        </p:spPr>
+        <p:style>
+          <a:lnRef idx="2">
+            <a:schemeClr val="accent1">
+              <a:shade val="15000"/>
+            </a:schemeClr>
+          </a:lnRef>
+          <a:fillRef idx="1">
+            <a:schemeClr val="accent1"/>
+          </a:fillRef>
+          <a:effectRef idx="0">
+            <a:schemeClr val="accent1"/>
+          </a:effectRef>
+          <a:fontRef idx="minor">
+            <a:schemeClr val="lt1"/>
+          </a:fontRef>
+        </p:style>
+        <p:txBody>
+          <a:bodyPr rtlCol="0" anchor="ctr"/>
+          <a:lstStyle/>
+          <a:p>
+            <a:pPr algn="ctr"/>
+            <a:endParaRPr lang="en-SG"/>
+          </a:p>
+        </p:txBody>
+      </p:sp>
+    </p:spTree>
+    <p:extLst>
+      <p:ext uri="{BB962C8B-B14F-4D97-AF65-F5344CB8AC3E}">
+        <p14:creationId xmlns:p14="http://schemas.microsoft.com/office/powerpoint/2010/main" val="2754564550"/>
       </p:ext>
     </p:extLst>
   </p:cSld>
@@ -6851,6 +7366,102 @@
     <p:extLst>
       <p:ext uri="{BB962C8B-B14F-4D97-AF65-F5344CB8AC3E}">
         <p14:creationId xmlns:p14="http://schemas.microsoft.com/office/powerpoint/2010/main" val="4115977209"/>
+      </p:ext>
+    </p:extLst>
+  </p:cSld>
+  <p:clrMapOvr>
+    <a:masterClrMapping/>
+  </p:clrMapOvr>
+</p:sld>
+</file>
+
+<file path=ppt/slides/slide30.xml><?xml version="1.0" encoding="utf-8"?>
+<p:sld xmlns:a="http://schemas.openxmlformats.org/drawingml/2006/main" xmlns:r="http://schemas.openxmlformats.org/officeDocument/2006/relationships" xmlns:p="http://schemas.openxmlformats.org/presentationml/2006/main">
+  <p:cSld>
+    <p:spTree>
+      <p:nvGrpSpPr>
+        <p:cNvPr id="1" name=""/>
+        <p:cNvGrpSpPr/>
+        <p:nvPr/>
+      </p:nvGrpSpPr>
+      <p:grpSpPr>
+        <a:xfrm>
+          <a:off x="0" y="0"/>
+          <a:ext cx="0" cy="0"/>
+          <a:chOff x="0" y="0"/>
+          <a:chExt cx="0" cy="0"/>
+        </a:xfrm>
+      </p:grpSpPr>
+      <p:sp>
+        <p:nvSpPr>
+          <p:cNvPr id="2" name="Title 1">
+            <a:extLst>
+              <a:ext uri="{FF2B5EF4-FFF2-40B4-BE49-F238E27FC236}">
+                <a16:creationId xmlns:a16="http://schemas.microsoft.com/office/drawing/2014/main" id="{5862D4D3-736D-5CC7-6715-5B7872E316FA}"/>
+              </a:ext>
+            </a:extLst>
+          </p:cNvPr>
+          <p:cNvSpPr>
+            <a:spLocks noGrp="1"/>
+          </p:cNvSpPr>
+          <p:nvPr>
+            <p:ph type="ctrTitle"/>
+          </p:nvPr>
+        </p:nvSpPr>
+        <p:spPr/>
+        <p:txBody>
+          <a:bodyPr/>
+          <a:lstStyle/>
+          <a:p>
+            <a:r>
+              <a:rPr lang="en-US" dirty="0"/>
+              <a:t>That’s how </a:t>
+            </a:r>
+            <a:r>
+              <a:rPr lang="en-US" dirty="0" err="1"/>
+              <a:t>Glamup</a:t>
+            </a:r>
+            <a:r>
+              <a:rPr lang="en-US" dirty="0"/>
+              <a:t> Works!</a:t>
+            </a:r>
+            <a:endParaRPr lang="en-SG" dirty="0"/>
+          </a:p>
+        </p:txBody>
+      </p:sp>
+      <p:sp>
+        <p:nvSpPr>
+          <p:cNvPr id="3" name="Subtitle 2">
+            <a:extLst>
+              <a:ext uri="{FF2B5EF4-FFF2-40B4-BE49-F238E27FC236}">
+                <a16:creationId xmlns:a16="http://schemas.microsoft.com/office/drawing/2014/main" id="{CA245029-3AD8-3686-1F4B-DEEC3902D5FC}"/>
+              </a:ext>
+            </a:extLst>
+          </p:cNvPr>
+          <p:cNvSpPr>
+            <a:spLocks noGrp="1"/>
+          </p:cNvSpPr>
+          <p:nvPr>
+            <p:ph type="subTitle" idx="1"/>
+          </p:nvPr>
+        </p:nvSpPr>
+        <p:spPr/>
+        <p:txBody>
+          <a:bodyPr/>
+          <a:lstStyle/>
+          <a:p>
+            <a:r>
+              <a:rPr lang="en-US" dirty="0"/>
+              <a:t>Thank you for watching!</a:t>
+            </a:r>
+            <a:endParaRPr lang="en-SG" dirty="0"/>
+          </a:p>
+        </p:txBody>
+      </p:sp>
+    </p:spTree>
+    <p:extLst>
+      <p:ext uri="{BB962C8B-B14F-4D97-AF65-F5344CB8AC3E}">
+        <p14:creationId xmlns:p14="http://schemas.microsoft.com/office/powerpoint/2010/main" val="3760336653"/>
       </p:ext>
     </p:extLst>
   </p:cSld>

</xml_diff>